<commit_message>
Introduction outline, design decision partial, aesthetic choices
</commit_message>
<xml_diff>
--- a/LOOM.pptx
+++ b/LOOM.pptx
@@ -208,7 +208,7 @@
           <a:p>
             <a:fld id="{34E29B8E-01FD-F149-8E4C-AD7340EC814F}" type="datetimeFigureOut">
               <a:rPr lang="en-US" smtClean="0"/>
-              <a:t>4/13/18</a:t>
+              <a:t>4/15/18</a:t>
             </a:fld>
             <a:endParaRPr lang="en-US"/>
           </a:p>
@@ -743,7 +743,7 @@
           <a:p>
             <a:fld id="{953DC447-F7D8-8648-AD82-BF48896FC0EA}" type="datetimeFigureOut">
               <a:rPr lang="en-US" smtClean="0"/>
-              <a:t>4/13/18</a:t>
+              <a:t>4/15/18</a:t>
             </a:fld>
             <a:endParaRPr lang="en-US"/>
           </a:p>
@@ -911,7 +911,7 @@
           <a:p>
             <a:fld id="{953DC447-F7D8-8648-AD82-BF48896FC0EA}" type="datetimeFigureOut">
               <a:rPr lang="en-US" smtClean="0"/>
-              <a:t>4/13/18</a:t>
+              <a:t>4/15/18</a:t>
             </a:fld>
             <a:endParaRPr lang="en-US"/>
           </a:p>
@@ -1089,7 +1089,7 @@
           <a:p>
             <a:fld id="{953DC447-F7D8-8648-AD82-BF48896FC0EA}" type="datetimeFigureOut">
               <a:rPr lang="en-US" smtClean="0"/>
-              <a:t>4/13/18</a:t>
+              <a:t>4/15/18</a:t>
             </a:fld>
             <a:endParaRPr lang="en-US"/>
           </a:p>
@@ -1257,7 +1257,7 @@
           <a:p>
             <a:fld id="{953DC447-F7D8-8648-AD82-BF48896FC0EA}" type="datetimeFigureOut">
               <a:rPr lang="en-US" smtClean="0"/>
-              <a:t>4/13/18</a:t>
+              <a:t>4/15/18</a:t>
             </a:fld>
             <a:endParaRPr lang="en-US"/>
           </a:p>
@@ -1502,7 +1502,7 @@
           <a:p>
             <a:fld id="{953DC447-F7D8-8648-AD82-BF48896FC0EA}" type="datetimeFigureOut">
               <a:rPr lang="en-US" smtClean="0"/>
-              <a:t>4/13/18</a:t>
+              <a:t>4/15/18</a:t>
             </a:fld>
             <a:endParaRPr lang="en-US"/>
           </a:p>
@@ -1787,7 +1787,7 @@
           <a:p>
             <a:fld id="{953DC447-F7D8-8648-AD82-BF48896FC0EA}" type="datetimeFigureOut">
               <a:rPr lang="en-US" smtClean="0"/>
-              <a:t>4/13/18</a:t>
+              <a:t>4/15/18</a:t>
             </a:fld>
             <a:endParaRPr lang="en-US"/>
           </a:p>
@@ -2211,7 +2211,7 @@
           <a:p>
             <a:fld id="{953DC447-F7D8-8648-AD82-BF48896FC0EA}" type="datetimeFigureOut">
               <a:rPr lang="en-US" smtClean="0"/>
-              <a:t>4/13/18</a:t>
+              <a:t>4/15/18</a:t>
             </a:fld>
             <a:endParaRPr lang="en-US"/>
           </a:p>
@@ -2328,7 +2328,7 @@
           <a:p>
             <a:fld id="{953DC447-F7D8-8648-AD82-BF48896FC0EA}" type="datetimeFigureOut">
               <a:rPr lang="en-US" smtClean="0"/>
-              <a:t>4/13/18</a:t>
+              <a:t>4/15/18</a:t>
             </a:fld>
             <a:endParaRPr lang="en-US"/>
           </a:p>
@@ -2423,7 +2423,7 @@
           <a:p>
             <a:fld id="{953DC447-F7D8-8648-AD82-BF48896FC0EA}" type="datetimeFigureOut">
               <a:rPr lang="en-US" smtClean="0"/>
-              <a:t>4/13/18</a:t>
+              <a:t>4/15/18</a:t>
             </a:fld>
             <a:endParaRPr lang="en-US"/>
           </a:p>
@@ -2698,7 +2698,7 @@
           <a:p>
             <a:fld id="{953DC447-F7D8-8648-AD82-BF48896FC0EA}" type="datetimeFigureOut">
               <a:rPr lang="en-US" smtClean="0"/>
-              <a:t>4/13/18</a:t>
+              <a:t>4/15/18</a:t>
             </a:fld>
             <a:endParaRPr lang="en-US"/>
           </a:p>
@@ -2950,7 +2950,7 @@
           <a:p>
             <a:fld id="{953DC447-F7D8-8648-AD82-BF48896FC0EA}" type="datetimeFigureOut">
               <a:rPr lang="en-US" smtClean="0"/>
-              <a:t>4/13/18</a:t>
+              <a:t>4/15/18</a:t>
             </a:fld>
             <a:endParaRPr lang="en-US"/>
           </a:p>
@@ -3161,7 +3161,7 @@
           <a:p>
             <a:fld id="{953DC447-F7D8-8648-AD82-BF48896FC0EA}" type="datetimeFigureOut">
               <a:rPr lang="en-US" smtClean="0"/>
-              <a:t>4/13/18</a:t>
+              <a:t>4/15/18</a:t>
             </a:fld>
             <a:endParaRPr lang="en-US"/>
           </a:p>
@@ -3545,12 +3545,14 @@
         <p:spPr>
           <a:xfrm>
             <a:off x="1208550" y="420502"/>
-            <a:ext cx="41793701" cy="7806176"/>
+            <a:ext cx="41793701" cy="3557897"/>
           </a:xfrm>
           <a:prstGeom prst="rect">
             <a:avLst/>
           </a:prstGeom>
-          <a:noFill/>
+          <a:solidFill>
+            <a:srgbClr val="BB0000"/>
+          </a:solidFill>
         </p:spPr>
         <p:txBody>
           <a:bodyPr wrap="square" rtlCol="0">
@@ -3558,21 +3560,24 @@
           </a:bodyPr>
           <a:lstStyle/>
           <a:p>
-            <a:pPr>
+            <a:pPr indent="460375">
               <a:lnSpc>
                 <a:spcPct val="130000"/>
               </a:lnSpc>
             </a:pPr>
             <a:r>
               <a:rPr lang="en-US" sz="8000" b="1" dirty="0">
+                <a:solidFill>
+                  <a:schemeClr val="bg1"/>
+                </a:solidFill>
                 <a:latin typeface="Helvetica Neue"/>
                 <a:cs typeface="Helvetica Neue"/>
               </a:rPr>
-              <a:t>LOOM</a:t>
-            </a:r>
-          </a:p>
-          <a:p>
-            <a:pPr>
+              <a:t>Project L.O.O.M</a:t>
+            </a:r>
+          </a:p>
+          <a:p>
+            <a:pPr indent="460375">
               <a:lnSpc>
                 <a:spcPct val="130000"/>
               </a:lnSpc>
@@ -3580,37 +3585,17 @@
             <a:r>
               <a:rPr lang="en-US" sz="4800" dirty="0">
                 <a:solidFill>
-                  <a:srgbClr val="7F7F7F"/>
+                  <a:schemeClr val="bg1"/>
                 </a:solidFill>
                 <a:latin typeface="Helvetica Neue"/>
                 <a:cs typeface="Helvetica Neue"/>
               </a:rPr>
-              <a:t>Michael Bayless, Wes </a:t>
+              <a:t>Michael Bayless, Wesley Darvin, Mohit Deshpande, Isaac Goldthwaite, Brad </a:t>
             </a:r>
             <a:r>
               <a:rPr lang="en-US" sz="4800" dirty="0" err="1">
                 <a:solidFill>
-                  <a:srgbClr val="7F7F7F"/>
-                </a:solidFill>
-                <a:latin typeface="Helvetica Neue"/>
-                <a:cs typeface="Helvetica Neue"/>
-              </a:rPr>
-              <a:t>Darvin</a:t>
-            </a:r>
-            <a:r>
-              <a:rPr lang="en-US" sz="4800" dirty="0">
-                <a:solidFill>
-                  <a:srgbClr val="7F7F7F"/>
-                </a:solidFill>
-                <a:latin typeface="Helvetica Neue"/>
-                <a:cs typeface="Helvetica Neue"/>
-              </a:rPr>
-              <a:t>, Mohit Deshpande, Isaac Goldthwaite, Brad </a:t>
-            </a:r>
-            <a:r>
-              <a:rPr lang="en-US" sz="4800" dirty="0" err="1">
-                <a:solidFill>
-                  <a:srgbClr val="7F7F7F"/>
+                  <a:schemeClr val="bg1"/>
                 </a:solidFill>
                 <a:latin typeface="Helvetica Neue"/>
                 <a:cs typeface="Helvetica Neue"/>
@@ -3620,69 +3605,54 @@
             <a:r>
               <a:rPr lang="en-US" sz="4800" dirty="0">
                 <a:solidFill>
-                  <a:srgbClr val="7F7F7F"/>
+                  <a:schemeClr val="bg1"/>
                 </a:solidFill>
                 <a:latin typeface="Helvetica Neue"/>
                 <a:cs typeface="Helvetica Neue"/>
               </a:rPr>
               <a:t> </a:t>
             </a:r>
-            <a:br>
-              <a:rPr lang="en-US" sz="4800" dirty="0">
-                <a:solidFill>
-                  <a:srgbClr val="7F7F7F"/>
-                </a:solidFill>
-                <a:latin typeface="Wingdings"/>
-                <a:cs typeface="Helvetica Neue"/>
-                <a:sym typeface="Wingdings"/>
-              </a:rPr>
-            </a:br>
-            <a:r>
-              <a:rPr lang="en-US" sz="4800" dirty="0">
-                <a:solidFill>
-                  <a:srgbClr val="7F7F7F"/>
-                </a:solidFill>
-                <a:latin typeface="Helvetica Neue"/>
-                <a:cs typeface="Helvetica Neue"/>
-              </a:rPr>
-              <a:t>{bayless.1, darvin.2, deshpande.75, goldthwaite.10, pershon.1} @ </a:t>
-            </a:r>
-            <a:r>
-              <a:rPr lang="en-US" sz="4800" dirty="0" err="1">
-                <a:solidFill>
-                  <a:srgbClr val="7F7F7F"/>
-                </a:solidFill>
-                <a:latin typeface="Helvetica Neue"/>
-                <a:cs typeface="Helvetica Neue"/>
-              </a:rPr>
-              <a:t>osu.edu</a:t>
-            </a:r>
             <a:endParaRPr lang="en-US" sz="4800" dirty="0">
               <a:solidFill>
-                <a:srgbClr val="7F7F7F"/>
+                <a:schemeClr val="bg1"/>
               </a:solidFill>
+              <a:latin typeface="Wingdings"/>
+              <a:cs typeface="Helvetica Neue"/>
+              <a:sym typeface="Wingdings"/>
             </a:endParaRPr>
           </a:p>
           <a:p>
-            <a:pPr>
+            <a:pPr indent="460375">
               <a:lnSpc>
                 <a:spcPct val="130000"/>
               </a:lnSpc>
             </a:pPr>
-            <a:endParaRPr lang="en-US" sz="11021" dirty="0">
-              <a:latin typeface="Helvetica Neue"/>
-              <a:cs typeface="Helvetica Neue"/>
-            </a:endParaRPr>
-          </a:p>
-          <a:p>
-            <a:pPr>
-              <a:lnSpc>
-                <a:spcPct val="130000"/>
-              </a:lnSpc>
-            </a:pPr>
-            <a:endParaRPr lang="en-US" sz="11166" b="1" dirty="0">
-              <a:latin typeface="Helvetica Neue"/>
-              <a:cs typeface="Helvetica Neue"/>
+            <a:r>
+              <a:rPr lang="en-US" sz="4800" dirty="0">
+                <a:solidFill>
+                  <a:schemeClr val="bg1"/>
+                </a:solidFill>
+                <a:latin typeface="Courier New" panose="02070309020205020404" pitchFamily="49" charset="0"/>
+                <a:cs typeface="Courier New" panose="02070309020205020404" pitchFamily="49" charset="0"/>
+              </a:rPr>
+              <a:t>{bayless.1, darvin.2, deshpande.75, goldthwaite.10, pershon.1} @ </a:t>
+            </a:r>
+            <a:r>
+              <a:rPr lang="en-US" sz="4800" dirty="0" err="1">
+                <a:solidFill>
+                  <a:schemeClr val="bg1"/>
+                </a:solidFill>
+                <a:latin typeface="Courier New" panose="02070309020205020404" pitchFamily="49" charset="0"/>
+                <a:cs typeface="Courier New" panose="02070309020205020404" pitchFamily="49" charset="0"/>
+              </a:rPr>
+              <a:t>osu.edu</a:t>
+            </a:r>
+            <a:endParaRPr lang="en-US" sz="4800" dirty="0">
+              <a:solidFill>
+                <a:schemeClr val="bg1"/>
+              </a:solidFill>
+              <a:latin typeface="Courier New" panose="02070309020205020404" pitchFamily="49" charset="0"/>
+              <a:cs typeface="Courier New" panose="02070309020205020404" pitchFamily="49" charset="0"/>
             </a:endParaRPr>
           </a:p>
         </p:txBody>
@@ -3690,13 +3660,15 @@
       <p:cxnSp>
         <p:nvCxnSpPr>
           <p:cNvPr id="10" name="Straight Connector 9"/>
-          <p:cNvCxnSpPr/>
+          <p:cNvCxnSpPr>
+            <a:cxnSpLocks/>
+          </p:cNvCxnSpPr>
           <p:nvPr/>
         </p:nvCxnSpPr>
         <p:spPr>
           <a:xfrm>
-            <a:off x="1314171" y="4010942"/>
-            <a:ext cx="41319128" cy="0"/>
+            <a:off x="1314171" y="4130213"/>
+            <a:ext cx="41688080" cy="0"/>
           </a:xfrm>
           <a:prstGeom prst="line">
             <a:avLst/>
@@ -3868,58 +3840,6 @@
           </a:fontRef>
         </p:style>
       </p:cxnSp>
-      <p:sp>
-        <p:nvSpPr>
-          <p:cNvPr id="44" name="Oval 43"/>
-          <p:cNvSpPr/>
-          <p:nvPr/>
-        </p:nvSpPr>
-        <p:spPr>
-          <a:xfrm>
-            <a:off x="42672337" y="3852262"/>
-            <a:ext cx="299431" cy="317359"/>
-          </a:xfrm>
-          <a:prstGeom prst="ellipse">
-            <a:avLst/>
-          </a:prstGeom>
-          <a:solidFill>
-            <a:schemeClr val="accent2">
-              <a:lumMod val="75000"/>
-            </a:schemeClr>
-          </a:solidFill>
-          <a:ln w="28575" cmpd="sng">
-            <a:solidFill>
-              <a:schemeClr val="tx1">
-                <a:lumMod val="65000"/>
-                <a:lumOff val="35000"/>
-              </a:schemeClr>
-            </a:solidFill>
-          </a:ln>
-          <a:effectLst/>
-        </p:spPr>
-        <p:style>
-          <a:lnRef idx="1">
-            <a:schemeClr val="accent1"/>
-          </a:lnRef>
-          <a:fillRef idx="3">
-            <a:schemeClr val="accent1"/>
-          </a:fillRef>
-          <a:effectRef idx="2">
-            <a:schemeClr val="accent1"/>
-          </a:effectRef>
-          <a:fontRef idx="minor">
-            <a:schemeClr val="lt1"/>
-          </a:fontRef>
-        </p:style>
-        <p:txBody>
-          <a:bodyPr rtlCol="0" anchor="ctr"/>
-          <a:lstStyle/>
-          <a:p>
-            <a:pPr algn="ctr"/>
-            <a:endParaRPr lang="en-US" sz="12201"/>
-          </a:p>
-        </p:txBody>
-      </p:sp>
       <p:sp>
         <p:nvSpPr>
           <p:cNvPr id="47" name="Oval 46"/>
@@ -4084,10 +4004,10 @@
         </p:nvGrpSpPr>
         <p:grpSpPr>
           <a:xfrm>
-            <a:off x="1208550" y="13039889"/>
-            <a:ext cx="12110742" cy="17192381"/>
-            <a:chOff x="1208550" y="9388793"/>
-            <a:chExt cx="12110742" cy="20843478"/>
+            <a:off x="1208550" y="13039892"/>
+            <a:ext cx="12110742" cy="17192378"/>
+            <a:chOff x="1208550" y="9388796"/>
+            <a:chExt cx="12110742" cy="20843475"/>
           </a:xfrm>
         </p:grpSpPr>
         <p:grpSp>
@@ -4098,10 +4018,10 @@
           </p:nvGrpSpPr>
           <p:grpSpPr>
             <a:xfrm>
-              <a:off x="1215092" y="9388793"/>
-              <a:ext cx="12104200" cy="1913426"/>
+              <a:off x="1215092" y="9388796"/>
+              <a:ext cx="12104200" cy="7769018"/>
               <a:chOff x="953556" y="7184343"/>
-              <a:chExt cx="10133496" cy="1009053"/>
+              <a:chExt cx="10133496" cy="4097022"/>
             </a:xfrm>
           </p:grpSpPr>
           <p:sp>
@@ -4148,7 +4068,7 @@
             <p:spPr>
               <a:xfrm>
                 <a:off x="953556" y="7885013"/>
-                <a:ext cx="10133496" cy="308383"/>
+                <a:ext cx="10133496" cy="3396352"/>
               </a:xfrm>
               <a:prstGeom prst="rect">
                 <a:avLst/>
@@ -4161,10 +4081,12 @@
               </a:bodyPr>
               <a:lstStyle/>
               <a:p>
-                <a:pPr algn="just">
+                <a:pPr marL="457200" indent="-457200" algn="just">
                   <a:spcBef>
                     <a:spcPct val="20000"/>
                   </a:spcBef>
+                  <a:buFont typeface="Arial" panose="020B0604020202020204" pitchFamily="34" charset="0"/>
+                  <a:buChar char="•"/>
                 </a:pPr>
                 <a:r>
                   <a:rPr lang="en-US" sz="3200" dirty="0">
@@ -4172,7 +4094,148 @@
                     <a:ea typeface="Helvetica Neue" charset="0"/>
                     <a:cs typeface="Helvetica Neue" charset="0"/>
                   </a:rPr>
-                  <a:t>A summary</a:t>
+                  <a:t>VS Code</a:t>
+                </a:r>
+              </a:p>
+              <a:p>
+                <a:pPr marL="457200" indent="-457200" algn="just">
+                  <a:spcBef>
+                    <a:spcPct val="20000"/>
+                  </a:spcBef>
+                  <a:buFont typeface="Arial" panose="020B0604020202020204" pitchFamily="34" charset="0"/>
+                  <a:buChar char="•"/>
+                </a:pPr>
+                <a:r>
+                  <a:rPr lang="en-US" sz="3200" dirty="0">
+                    <a:latin typeface="Helvetica Neue" charset="0"/>
+                    <a:ea typeface="Helvetica Neue" charset="0"/>
+                    <a:cs typeface="Helvetica Neue" charset="0"/>
+                  </a:rPr>
+                  <a:t>Python support</a:t>
+                </a:r>
+              </a:p>
+              <a:p>
+                <a:pPr marL="457200" indent="-457200" algn="just">
+                  <a:spcBef>
+                    <a:spcPct val="20000"/>
+                  </a:spcBef>
+                  <a:buFont typeface="Arial" panose="020B0604020202020204" pitchFamily="34" charset="0"/>
+                  <a:buChar char="•"/>
+                </a:pPr>
+                <a:r>
+                  <a:rPr lang="en-US" sz="3200" dirty="0">
+                    <a:latin typeface="Helvetica Neue" charset="0"/>
+                    <a:ea typeface="Helvetica Neue" charset="0"/>
+                    <a:cs typeface="Helvetica Neue" charset="0"/>
+                  </a:rPr>
+                  <a:t>Algorithm and python doc data</a:t>
+                </a:r>
+              </a:p>
+              <a:p>
+                <a:pPr marL="457200" indent="-457200" algn="just">
+                  <a:spcBef>
+                    <a:spcPct val="20000"/>
+                  </a:spcBef>
+                  <a:buFont typeface="Arial" panose="020B0604020202020204" pitchFamily="34" charset="0"/>
+                  <a:buChar char="•"/>
+                </a:pPr>
+                <a:r>
+                  <a:rPr lang="en-US" sz="3200" dirty="0">
+                    <a:latin typeface="Helvetica Neue" charset="0"/>
+                    <a:ea typeface="Helvetica Neue" charset="0"/>
+                    <a:cs typeface="Helvetica Neue" charset="0"/>
+                  </a:rPr>
+                  <a:t>Discovery and NLC data paths</a:t>
+                </a:r>
+              </a:p>
+              <a:p>
+                <a:pPr marL="457200" indent="-457200" algn="just">
+                  <a:spcBef>
+                    <a:spcPct val="20000"/>
+                  </a:spcBef>
+                  <a:buFont typeface="Arial" panose="020B0604020202020204" pitchFamily="34" charset="0"/>
+                  <a:buChar char="•"/>
+                </a:pPr>
+                <a:r>
+                  <a:rPr lang="en-US" sz="3200" dirty="0">
+                    <a:latin typeface="Helvetica Neue" charset="0"/>
+                    <a:ea typeface="Helvetica Neue" charset="0"/>
+                    <a:cs typeface="Helvetica Neue" charset="0"/>
+                  </a:rPr>
+                  <a:t>Results</a:t>
+                </a:r>
+              </a:p>
+              <a:p>
+                <a:pPr marL="2598385" lvl="1" indent="-457200" algn="just">
+                  <a:spcBef>
+                    <a:spcPct val="20000"/>
+                  </a:spcBef>
+                  <a:buFont typeface="Arial" panose="020B0604020202020204" pitchFamily="34" charset="0"/>
+                  <a:buChar char="•"/>
+                </a:pPr>
+                <a:r>
+                  <a:rPr lang="en-US" sz="3200" dirty="0">
+                    <a:latin typeface="Helvetica Neue" charset="0"/>
+                    <a:ea typeface="Helvetica Neue" charset="0"/>
+                    <a:cs typeface="Helvetica Neue" charset="0"/>
+                  </a:rPr>
+                  <a:t>Description</a:t>
+                </a:r>
+              </a:p>
+              <a:p>
+                <a:pPr marL="2598385" lvl="1" indent="-457200" algn="just">
+                  <a:spcBef>
+                    <a:spcPct val="20000"/>
+                  </a:spcBef>
+                  <a:buFont typeface="Arial" panose="020B0604020202020204" pitchFamily="34" charset="0"/>
+                  <a:buChar char="•"/>
+                </a:pPr>
+                <a:r>
+                  <a:rPr lang="en-US" sz="3200" dirty="0">
+                    <a:latin typeface="Helvetica Neue" charset="0"/>
+                    <a:ea typeface="Helvetica Neue" charset="0"/>
+                    <a:cs typeface="Helvetica Neue" charset="0"/>
+                  </a:rPr>
+                  <a:t>Pseudocode</a:t>
+                </a:r>
+              </a:p>
+              <a:p>
+                <a:pPr marL="2598385" lvl="1" indent="-457200" algn="just">
+                  <a:spcBef>
+                    <a:spcPct val="20000"/>
+                  </a:spcBef>
+                  <a:buFont typeface="Arial" panose="020B0604020202020204" pitchFamily="34" charset="0"/>
+                  <a:buChar char="•"/>
+                </a:pPr>
+                <a:r>
+                  <a:rPr lang="en-US" sz="3200" dirty="0" err="1">
+                    <a:latin typeface="Helvetica Neue" charset="0"/>
+                    <a:ea typeface="Helvetica Neue" charset="0"/>
+                    <a:cs typeface="Helvetica Neue" charset="0"/>
+                  </a:rPr>
+                  <a:t>Samplecode</a:t>
+                </a:r>
+                <a:endParaRPr lang="en-US" sz="3200" dirty="0">
+                  <a:latin typeface="Helvetica Neue" charset="0"/>
+                  <a:ea typeface="Helvetica Neue" charset="0"/>
+                  <a:cs typeface="Helvetica Neue" charset="0"/>
+                </a:endParaRPr>
+              </a:p>
+              <a:p>
+                <a:pPr marL="457200" indent="-457200" algn="just">
+                  <a:spcBef>
+                    <a:spcPct val="20000"/>
+                  </a:spcBef>
+                  <a:buFont typeface="Arial" panose="020B0604020202020204" pitchFamily="34" charset="0"/>
+                  <a:buChar char="•"/>
+                </a:pPr>
+                <a:r>
+                  <a:rPr lang="en-US" sz="3200" dirty="0">
+                    <a:latin typeface="Helvetica Neue" charset="0"/>
+                    <a:ea typeface="Helvetica Neue" charset="0"/>
+                    <a:cs typeface="Helvetica Neue" charset="0"/>
+                  </a:rPr>
+                  <a:t>Anything else you want to include</a:t>
                 </a:r>
               </a:p>
             </p:txBody>
@@ -4241,7 +4304,7 @@
         </p:nvGrpSpPr>
         <p:grpSpPr>
           <a:xfrm>
-            <a:off x="13629011" y="5246385"/>
+            <a:off x="13904924" y="4490144"/>
             <a:ext cx="14458893" cy="25011314"/>
             <a:chOff x="13629011" y="5246385"/>
             <a:chExt cx="14458893" cy="25011314"/>
@@ -4704,14 +4767,212 @@
         </p:blipFill>
         <p:spPr>
           <a:xfrm>
-            <a:off x="39379696" y="235122"/>
-            <a:ext cx="3292641" cy="3619606"/>
+            <a:off x="39976037" y="214258"/>
+            <a:ext cx="3239293" cy="3560960"/>
           </a:xfrm>
           <a:prstGeom prst="rect">
             <a:avLst/>
           </a:prstGeom>
         </p:spPr>
       </p:pic>
+      <p:sp>
+        <p:nvSpPr>
+          <p:cNvPr id="19" name="TextBox 18">
+            <a:extLst>
+              <a:ext uri="{FF2B5EF4-FFF2-40B4-BE49-F238E27FC236}">
+                <a16:creationId xmlns:a16="http://schemas.microsoft.com/office/drawing/2014/main" id="{9EA50CB9-7A63-4B49-BFA4-DBE38E805BB1}"/>
+              </a:ext>
+            </a:extLst>
+          </p:cNvPr>
+          <p:cNvSpPr txBox="1"/>
+          <p:nvPr/>
+        </p:nvSpPr>
+        <p:spPr>
+          <a:xfrm>
+            <a:off x="15425530" y="17890435"/>
+            <a:ext cx="184731" cy="1387175"/>
+          </a:xfrm>
+          <a:prstGeom prst="rect">
+            <a:avLst/>
+          </a:prstGeom>
+          <a:noFill/>
+        </p:spPr>
+        <p:txBody>
+          <a:bodyPr wrap="none" rtlCol="0">
+            <a:spAutoFit/>
+          </a:bodyPr>
+          <a:lstStyle/>
+          <a:p>
+            <a:endParaRPr lang="en-US" dirty="0"/>
+          </a:p>
+        </p:txBody>
+      </p:sp>
+      <p:sp>
+        <p:nvSpPr>
+          <p:cNvPr id="46" name="TextBox 45">
+            <a:extLst>
+              <a:ext uri="{FF2B5EF4-FFF2-40B4-BE49-F238E27FC236}">
+                <a16:creationId xmlns:a16="http://schemas.microsoft.com/office/drawing/2014/main" id="{B152D510-FF06-CF45-BC2C-8DAB75E95631}"/>
+              </a:ext>
+            </a:extLst>
+          </p:cNvPr>
+          <p:cNvSpPr txBox="1"/>
+          <p:nvPr/>
+        </p:nvSpPr>
+        <p:spPr>
+          <a:xfrm>
+            <a:off x="13904924" y="15291510"/>
+            <a:ext cx="8489504" cy="1231106"/>
+          </a:xfrm>
+          <a:prstGeom prst="rect">
+            <a:avLst/>
+          </a:prstGeom>
+          <a:noFill/>
+        </p:spPr>
+        <p:txBody>
+          <a:bodyPr wrap="none" lIns="0" tIns="0" rIns="0" bIns="0" rtlCol="0">
+            <a:spAutoFit/>
+          </a:bodyPr>
+          <a:lstStyle/>
+          <a:p>
+            <a:r>
+              <a:rPr lang="en-US" sz="8000" b="1" dirty="0">
+                <a:solidFill>
+                  <a:srgbClr val="7F7F7F"/>
+                </a:solidFill>
+                <a:latin typeface="Helvetica Neue"/>
+                <a:cs typeface="Helvetica Neue"/>
+              </a:rPr>
+              <a:t>Design Decisions</a:t>
+            </a:r>
+          </a:p>
+        </p:txBody>
+      </p:sp>
+      <p:sp>
+        <p:nvSpPr>
+          <p:cNvPr id="26" name="TextBox 25">
+            <a:extLst>
+              <a:ext uri="{FF2B5EF4-FFF2-40B4-BE49-F238E27FC236}">
+                <a16:creationId xmlns:a16="http://schemas.microsoft.com/office/drawing/2014/main" id="{16CA717B-07C5-C446-81B0-4E92E5CFC4C6}"/>
+              </a:ext>
+            </a:extLst>
+          </p:cNvPr>
+          <p:cNvSpPr txBox="1"/>
+          <p:nvPr/>
+        </p:nvSpPr>
+        <p:spPr>
+          <a:xfrm>
+            <a:off x="13916838" y="16522616"/>
+            <a:ext cx="13515162" cy="6986528"/>
+          </a:xfrm>
+          <a:prstGeom prst="rect">
+            <a:avLst/>
+          </a:prstGeom>
+          <a:noFill/>
+        </p:spPr>
+        <p:txBody>
+          <a:bodyPr wrap="square" rtlCol="0">
+            <a:spAutoFit/>
+          </a:bodyPr>
+          <a:lstStyle/>
+          <a:p>
+            <a:pPr marL="457200" indent="-457200">
+              <a:buFont typeface="Arial" panose="020B0604020202020204" pitchFamily="34" charset="0"/>
+              <a:buChar char="•"/>
+            </a:pPr>
+            <a:r>
+              <a:rPr lang="en-US" sz="3200" b="1" dirty="0">
+                <a:latin typeface="Helvetica Neue" panose="02000503000000020004" pitchFamily="2" charset="0"/>
+                <a:ea typeface="Helvetica Neue" panose="02000503000000020004" pitchFamily="2" charset="0"/>
+                <a:cs typeface="Helvetica Neue" panose="02000503000000020004" pitchFamily="2" charset="0"/>
+              </a:rPr>
+              <a:t>Visual Studio Code extension:</a:t>
+            </a:r>
+            <a:r>
+              <a:rPr lang="en-US" sz="3200" dirty="0">
+                <a:latin typeface="Helvetica Neue" panose="02000503000000020004" pitchFamily="2" charset="0"/>
+                <a:ea typeface="Helvetica Neue" panose="02000503000000020004" pitchFamily="2" charset="0"/>
+                <a:cs typeface="Helvetica Neue" panose="02000503000000020004" pitchFamily="2" charset="0"/>
+              </a:rPr>
+              <a:t> Early in the design process the LOOM team had to consider for what platform we would develop this tool.  Early options considered included: Eclipse IDE, VS Code, and a custom text editor we would build.  Ultimately, VS Code was selected for its apparent ease of development and flexibility.</a:t>
+            </a:r>
+          </a:p>
+          <a:p>
+            <a:pPr marL="457200" indent="-457200">
+              <a:buFont typeface="Arial" panose="020B0604020202020204" pitchFamily="34" charset="0"/>
+              <a:buChar char="•"/>
+            </a:pPr>
+            <a:r>
+              <a:rPr lang="en-US" sz="3200" b="1" dirty="0">
+                <a:latin typeface="Helvetica Neue" panose="02000503000000020004" pitchFamily="2" charset="0"/>
+                <a:ea typeface="Helvetica Neue" panose="02000503000000020004" pitchFamily="2" charset="0"/>
+                <a:cs typeface="Helvetica Neue" panose="02000503000000020004" pitchFamily="2" charset="0"/>
+              </a:rPr>
+              <a:t>Python language support: </a:t>
+            </a:r>
+            <a:r>
+              <a:rPr lang="en-US" sz="3200" dirty="0">
+                <a:latin typeface="Helvetica Neue" panose="02000503000000020004" pitchFamily="2" charset="0"/>
+                <a:ea typeface="Helvetica Neue" panose="02000503000000020004" pitchFamily="2" charset="0"/>
+                <a:cs typeface="Helvetica Neue" panose="02000503000000020004" pitchFamily="2" charset="0"/>
+              </a:rPr>
+              <a:t>Another early design choice was selecting a language to support.  While the collection of results would need to be curated/created regardless of language, there were concerns about integration with IBM Watson tools and language parsing.  In the end Python was chosen over languages like C, C++, and Java for its syntactic simplicity and minimal boilerplate code.</a:t>
+            </a:r>
+          </a:p>
+          <a:p>
+            <a:pPr marL="457200" indent="-457200">
+              <a:buFont typeface="Arial" panose="020B0604020202020204" pitchFamily="34" charset="0"/>
+              <a:buChar char="•"/>
+            </a:pPr>
+            <a:r>
+              <a:rPr lang="en-US" sz="3200" b="1" dirty="0">
+                <a:latin typeface="Helvetica Neue" panose="02000503000000020004" pitchFamily="2" charset="0"/>
+                <a:ea typeface="Helvetica Neue" panose="02000503000000020004" pitchFamily="2" charset="0"/>
+                <a:cs typeface="Helvetica Neue" panose="02000503000000020004" pitchFamily="2" charset="0"/>
+              </a:rPr>
+              <a:t>NLC: </a:t>
+            </a:r>
+            <a:r>
+              <a:rPr lang="en-US" sz="3200" dirty="0">
+                <a:highlight>
+                  <a:srgbClr val="FFFF00"/>
+                </a:highlight>
+                <a:latin typeface="Helvetica Neue" panose="02000503000000020004" pitchFamily="2" charset="0"/>
+                <a:ea typeface="Helvetica Neue" panose="02000503000000020004" pitchFamily="2" charset="0"/>
+                <a:cs typeface="Helvetica Neue" panose="02000503000000020004" pitchFamily="2" charset="0"/>
+              </a:rPr>
+              <a:t>TODO: Write why we chose NLC</a:t>
+            </a:r>
+          </a:p>
+          <a:p>
+            <a:pPr marL="457200" indent="-457200">
+              <a:buFont typeface="Arial" panose="020B0604020202020204" pitchFamily="34" charset="0"/>
+              <a:buChar char="•"/>
+            </a:pPr>
+            <a:r>
+              <a:rPr lang="en-US" sz="3200" b="1" dirty="0">
+                <a:latin typeface="Helvetica Neue" panose="02000503000000020004" pitchFamily="2" charset="0"/>
+                <a:ea typeface="Helvetica Neue" panose="02000503000000020004" pitchFamily="2" charset="0"/>
+                <a:cs typeface="Helvetica Neue" panose="02000503000000020004" pitchFamily="2" charset="0"/>
+              </a:rPr>
+              <a:t>Algorithm Support: </a:t>
+            </a:r>
+            <a:r>
+              <a:rPr lang="en-US" sz="3200" dirty="0">
+                <a:latin typeface="Helvetica Neue" panose="02000503000000020004" pitchFamily="2" charset="0"/>
+                <a:ea typeface="Helvetica Neue" panose="02000503000000020004" pitchFamily="2" charset="0"/>
+                <a:cs typeface="Helvetica Neue" panose="02000503000000020004" pitchFamily="2" charset="0"/>
+              </a:rPr>
+              <a:t>TODO: Why we chose the algorithms we did (important basics, ease of development, etc.)</a:t>
+            </a:r>
+            <a:endParaRPr lang="en-US" sz="3200" b="1" dirty="0">
+              <a:latin typeface="Helvetica Neue" panose="02000503000000020004" pitchFamily="2" charset="0"/>
+              <a:ea typeface="Helvetica Neue" panose="02000503000000020004" pitchFamily="2" charset="0"/>
+              <a:cs typeface="Helvetica Neue" panose="02000503000000020004" pitchFamily="2" charset="0"/>
+            </a:endParaRPr>
+          </a:p>
+        </p:txBody>
+      </p:sp>
     </p:spTree>
     <p:extLst>
       <p:ext uri="{BB962C8B-B14F-4D97-AF65-F5344CB8AC3E}">

</xml_diff>

<commit_message>
Added subheadings to decrease empty space
</commit_message>
<xml_diff>
--- a/LOOM.pptx
+++ b/LOOM.pptx
@@ -208,7 +208,7 @@
           <a:p>
             <a:fld id="{34E29B8E-01FD-F149-8E4C-AD7340EC814F}" type="datetimeFigureOut">
               <a:rPr lang="en-US" smtClean="0"/>
-              <a:t>4/17/18</a:t>
+              <a:t>4/18/18</a:t>
             </a:fld>
             <a:endParaRPr lang="en-US"/>
           </a:p>
@@ -743,7 +743,7 @@
           <a:p>
             <a:fld id="{953DC447-F7D8-8648-AD82-BF48896FC0EA}" type="datetimeFigureOut">
               <a:rPr lang="en-US" smtClean="0"/>
-              <a:t>4/17/18</a:t>
+              <a:t>4/18/18</a:t>
             </a:fld>
             <a:endParaRPr lang="en-US"/>
           </a:p>
@@ -911,7 +911,7 @@
           <a:p>
             <a:fld id="{953DC447-F7D8-8648-AD82-BF48896FC0EA}" type="datetimeFigureOut">
               <a:rPr lang="en-US" smtClean="0"/>
-              <a:t>4/17/18</a:t>
+              <a:t>4/18/18</a:t>
             </a:fld>
             <a:endParaRPr lang="en-US"/>
           </a:p>
@@ -1089,7 +1089,7 @@
           <a:p>
             <a:fld id="{953DC447-F7D8-8648-AD82-BF48896FC0EA}" type="datetimeFigureOut">
               <a:rPr lang="en-US" smtClean="0"/>
-              <a:t>4/17/18</a:t>
+              <a:t>4/18/18</a:t>
             </a:fld>
             <a:endParaRPr lang="en-US"/>
           </a:p>
@@ -1257,7 +1257,7 @@
           <a:p>
             <a:fld id="{953DC447-F7D8-8648-AD82-BF48896FC0EA}" type="datetimeFigureOut">
               <a:rPr lang="en-US" smtClean="0"/>
-              <a:t>4/17/18</a:t>
+              <a:t>4/18/18</a:t>
             </a:fld>
             <a:endParaRPr lang="en-US"/>
           </a:p>
@@ -1502,7 +1502,7 @@
           <a:p>
             <a:fld id="{953DC447-F7D8-8648-AD82-BF48896FC0EA}" type="datetimeFigureOut">
               <a:rPr lang="en-US" smtClean="0"/>
-              <a:t>4/17/18</a:t>
+              <a:t>4/18/18</a:t>
             </a:fld>
             <a:endParaRPr lang="en-US"/>
           </a:p>
@@ -1787,7 +1787,7 @@
           <a:p>
             <a:fld id="{953DC447-F7D8-8648-AD82-BF48896FC0EA}" type="datetimeFigureOut">
               <a:rPr lang="en-US" smtClean="0"/>
-              <a:t>4/17/18</a:t>
+              <a:t>4/18/18</a:t>
             </a:fld>
             <a:endParaRPr lang="en-US"/>
           </a:p>
@@ -2211,7 +2211,7 @@
           <a:p>
             <a:fld id="{953DC447-F7D8-8648-AD82-BF48896FC0EA}" type="datetimeFigureOut">
               <a:rPr lang="en-US" smtClean="0"/>
-              <a:t>4/17/18</a:t>
+              <a:t>4/18/18</a:t>
             </a:fld>
             <a:endParaRPr lang="en-US"/>
           </a:p>
@@ -2328,7 +2328,7 @@
           <a:p>
             <a:fld id="{953DC447-F7D8-8648-AD82-BF48896FC0EA}" type="datetimeFigureOut">
               <a:rPr lang="en-US" smtClean="0"/>
-              <a:t>4/17/18</a:t>
+              <a:t>4/18/18</a:t>
             </a:fld>
             <a:endParaRPr lang="en-US"/>
           </a:p>
@@ -2423,7 +2423,7 @@
           <a:p>
             <a:fld id="{953DC447-F7D8-8648-AD82-BF48896FC0EA}" type="datetimeFigureOut">
               <a:rPr lang="en-US" smtClean="0"/>
-              <a:t>4/17/18</a:t>
+              <a:t>4/18/18</a:t>
             </a:fld>
             <a:endParaRPr lang="en-US"/>
           </a:p>
@@ -2698,7 +2698,7 @@
           <a:p>
             <a:fld id="{953DC447-F7D8-8648-AD82-BF48896FC0EA}" type="datetimeFigureOut">
               <a:rPr lang="en-US" smtClean="0"/>
-              <a:t>4/17/18</a:t>
+              <a:t>4/18/18</a:t>
             </a:fld>
             <a:endParaRPr lang="en-US"/>
           </a:p>
@@ -2950,7 +2950,7 @@
           <a:p>
             <a:fld id="{953DC447-F7D8-8648-AD82-BF48896FC0EA}" type="datetimeFigureOut">
               <a:rPr lang="en-US" smtClean="0"/>
-              <a:t>4/17/18</a:t>
+              <a:t>4/18/18</a:t>
             </a:fld>
             <a:endParaRPr lang="en-US"/>
           </a:p>
@@ -3161,7 +3161,7 @@
           <a:p>
             <a:fld id="{953DC447-F7D8-8648-AD82-BF48896FC0EA}" type="datetimeFigureOut">
               <a:rPr lang="en-US" smtClean="0"/>
-              <a:t>4/17/18</a:t>
+              <a:t>4/18/18</a:t>
             </a:fld>
             <a:endParaRPr lang="en-US"/>
           </a:p>
@@ -3628,7 +3628,7 @@
               </a:lnSpc>
             </a:pPr>
             <a:r>
-              <a:rPr lang="en-US" sz="4800" dirty="0">
+              <a:rPr lang="en-US" sz="4800" b="1" dirty="0">
                 <a:solidFill>
                   <a:schemeClr val="bg1"/>
                 </a:solidFill>
@@ -3638,7 +3638,7 @@
               <a:t>{bayless.1, darvin.2, deshpande.75, goldthwaite.10, pershon.1} @ </a:t>
             </a:r>
             <a:r>
-              <a:rPr lang="en-US" sz="4800" dirty="0" err="1">
+              <a:rPr lang="en-US" sz="4800" b="1" dirty="0" err="1">
                 <a:solidFill>
                   <a:schemeClr val="bg1"/>
                 </a:solidFill>
@@ -3647,7 +3647,7 @@
               </a:rPr>
               <a:t>osu.edu</a:t>
             </a:r>
-            <a:endParaRPr lang="en-US" sz="4800" dirty="0">
+            <a:endParaRPr lang="en-US" sz="4800" b="1" dirty="0">
               <a:solidFill>
                 <a:schemeClr val="bg1"/>
               </a:solidFill>
@@ -4234,7 +4234,7 @@
         <p:spPr>
           <a:xfrm>
             <a:off x="13916838" y="6749977"/>
-            <a:ext cx="13515162" cy="19174480"/>
+            <a:ext cx="13515162" cy="21636692"/>
           </a:xfrm>
           <a:prstGeom prst="rect">
             <a:avLst/>
@@ -4249,20 +4249,23 @@
           <a:p>
             <a:pPr algn="just"/>
             <a:r>
-              <a:rPr lang="en-US" sz="4000" b="1" dirty="0">
+              <a:rPr lang="en-US" sz="4800" b="1" dirty="0">
                 <a:latin typeface="Helvetica Neue" panose="02000503000000020004" pitchFamily="2" charset="0"/>
                 <a:ea typeface="Helvetica Neue" panose="02000503000000020004" pitchFamily="2" charset="0"/>
                 <a:cs typeface="Helvetica Neue" panose="02000503000000020004" pitchFamily="2" charset="0"/>
               </a:rPr>
-              <a:t>Visual Studio Code extension:</a:t>
-            </a:r>
+              <a:t>Visual Studio Code extension</a:t>
+            </a:r>
+          </a:p>
+          <a:p>
+            <a:pPr algn="just"/>
             <a:r>
               <a:rPr lang="en-US" sz="4000" dirty="0">
                 <a:latin typeface="Helvetica Neue" panose="02000503000000020004" pitchFamily="2" charset="0"/>
                 <a:ea typeface="Helvetica Neue" panose="02000503000000020004" pitchFamily="2" charset="0"/>
                 <a:cs typeface="Helvetica Neue" panose="02000503000000020004" pitchFamily="2" charset="0"/>
               </a:rPr>
-              <a:t> Early in the design process the LOOM team had to consider for what platform we would develop this tool.  Early options considered included: Eclipse IDE, VS Code, and a custom text editor we would build.  Ultimately, VS Code was selected for its apparent ease of development and flexibility.</a:t>
+              <a:t>Early in the design process the LOOM team had to consider for what platform we would develop this tool.  Early options considered included: Eclipse IDE, VS Code, and a custom text editor we would build.  Ultimately, VS Code was selected for its apparent ease of development and flexibility.</a:t>
             </a:r>
           </a:p>
           <a:p>
@@ -4276,13 +4279,16 @@
           <a:p>
             <a:pPr algn="just"/>
             <a:r>
-              <a:rPr lang="en-US" sz="4000" b="1" dirty="0">
+              <a:rPr lang="en-US" sz="4800" b="1" dirty="0">
                 <a:latin typeface="Helvetica Neue" panose="02000503000000020004" pitchFamily="2" charset="0"/>
                 <a:ea typeface="Helvetica Neue" panose="02000503000000020004" pitchFamily="2" charset="0"/>
                 <a:cs typeface="Helvetica Neue" panose="02000503000000020004" pitchFamily="2" charset="0"/>
               </a:rPr>
-              <a:t>Python language support: </a:t>
-            </a:r>
+              <a:t>Python language support</a:t>
+            </a:r>
+          </a:p>
+          <a:p>
+            <a:pPr algn="just"/>
             <a:r>
               <a:rPr lang="en-US" sz="4000" dirty="0">
                 <a:latin typeface="Helvetica Neue" panose="02000503000000020004" pitchFamily="2" charset="0"/>
@@ -4303,13 +4309,16 @@
           <a:p>
             <a:pPr algn="just"/>
             <a:r>
-              <a:rPr lang="en-US" sz="4000" b="1" dirty="0">
+              <a:rPr lang="en-US" sz="4800" b="1" dirty="0">
                 <a:latin typeface="Helvetica Neue" panose="02000503000000020004" pitchFamily="2" charset="0"/>
                 <a:ea typeface="Helvetica Neue" panose="02000503000000020004" pitchFamily="2" charset="0"/>
                 <a:cs typeface="Helvetica Neue" panose="02000503000000020004" pitchFamily="2" charset="0"/>
               </a:rPr>
-              <a:t>NLC: </a:t>
-            </a:r>
+              <a:t>NLC</a:t>
+            </a:r>
+          </a:p>
+          <a:p>
+            <a:pPr algn="just"/>
             <a:r>
               <a:rPr lang="en-US" sz="4000" dirty="0">
                 <a:latin typeface="Helvetica Neue" panose="02000503000000020004" pitchFamily="2" charset="0"/>
@@ -4333,13 +4342,16 @@
           <a:p>
             <a:pPr algn="just"/>
             <a:r>
-              <a:rPr lang="en-US" sz="4000" b="1" dirty="0">
+              <a:rPr lang="en-US" sz="4800" b="1" dirty="0">
                 <a:latin typeface="Helvetica Neue" panose="02000503000000020004" pitchFamily="2" charset="0"/>
                 <a:ea typeface="Helvetica Neue" panose="02000503000000020004" pitchFamily="2" charset="0"/>
                 <a:cs typeface="Helvetica Neue" panose="02000503000000020004" pitchFamily="2" charset="0"/>
               </a:rPr>
-              <a:t>Algorithm Support: </a:t>
-            </a:r>
+              <a:t>Algorithm Support</a:t>
+            </a:r>
+          </a:p>
+          <a:p>
+            <a:pPr algn="just"/>
             <a:r>
               <a:rPr lang="en-US" sz="4000" dirty="0">
                 <a:latin typeface="Helvetica Neue" panose="02000503000000020004" pitchFamily="2" charset="0"/>

</xml_diff>